<commit_message>
Cierre cuarto bimestre TMI
</commit_message>
<xml_diff>
--- a/JeanPiaget/2019-2020/Cuarentena/Evaluación Final.pptx
+++ b/JeanPiaget/2019-2020/Cuarentena/Evaluación Final.pptx
@@ -10,9 +10,12 @@
     <p:sldId id="262" r:id="rId4"/>
     <p:sldId id="258" r:id="rId5"/>
     <p:sldId id="263" r:id="rId6"/>
-    <p:sldId id="260" r:id="rId7"/>
-    <p:sldId id="261" r:id="rId8"/>
-    <p:sldId id="264" r:id="rId9"/>
+    <p:sldId id="265" r:id="rId7"/>
+    <p:sldId id="266" r:id="rId8"/>
+    <p:sldId id="260" r:id="rId9"/>
+    <p:sldId id="267" r:id="rId10"/>
+    <p:sldId id="261" r:id="rId11"/>
+    <p:sldId id="264" r:id="rId12"/>
   </p:sldIdLst>
   <p:sldSz cx="12192000" cy="6858000"/>
   <p:notesSz cx="6858000" cy="9144000"/>
@@ -111,6 +114,11 @@
       </a:defRPr>
     </a:lvl9pPr>
   </p:defaultTextStyle>
+  <p:extLst>
+    <p:ext uri="{EFAFB233-063F-42B5-8137-9DF3F51BA10A}">
+      <p15:sldGuideLst xmlns:p15="http://schemas.microsoft.com/office/powerpoint/2012/main"/>
+    </p:ext>
+  </p:extLst>
 </p:presentation>
 </file>
 
@@ -263,7 +271,7 @@
           <a:p>
             <a:fld id="{D4424E7B-3FD6-40DA-AC15-348ED00BB287}" type="datetimeFigureOut">
               <a:rPr lang="es-MX" smtClean="0"/>
-              <a:t>15/04/2020</a:t>
+              <a:t>23/04/2020</a:t>
             </a:fld>
             <a:endParaRPr lang="es-MX"/>
           </a:p>
@@ -463,7 +471,7 @@
           <a:p>
             <a:fld id="{D4424E7B-3FD6-40DA-AC15-348ED00BB287}" type="datetimeFigureOut">
               <a:rPr lang="es-MX" smtClean="0"/>
-              <a:t>15/04/2020</a:t>
+              <a:t>23/04/2020</a:t>
             </a:fld>
             <a:endParaRPr lang="es-MX"/>
           </a:p>
@@ -673,7 +681,7 @@
           <a:p>
             <a:fld id="{D4424E7B-3FD6-40DA-AC15-348ED00BB287}" type="datetimeFigureOut">
               <a:rPr lang="es-MX" smtClean="0"/>
-              <a:t>15/04/2020</a:t>
+              <a:t>23/04/2020</a:t>
             </a:fld>
             <a:endParaRPr lang="es-MX"/>
           </a:p>
@@ -873,7 +881,7 @@
           <a:p>
             <a:fld id="{D4424E7B-3FD6-40DA-AC15-348ED00BB287}" type="datetimeFigureOut">
               <a:rPr lang="es-MX" smtClean="0"/>
-              <a:t>15/04/2020</a:t>
+              <a:t>23/04/2020</a:t>
             </a:fld>
             <a:endParaRPr lang="es-MX"/>
           </a:p>
@@ -1149,7 +1157,7 @@
           <a:p>
             <a:fld id="{D4424E7B-3FD6-40DA-AC15-348ED00BB287}" type="datetimeFigureOut">
               <a:rPr lang="es-MX" smtClean="0"/>
-              <a:t>15/04/2020</a:t>
+              <a:t>23/04/2020</a:t>
             </a:fld>
             <a:endParaRPr lang="es-MX"/>
           </a:p>
@@ -1417,7 +1425,7 @@
           <a:p>
             <a:fld id="{D4424E7B-3FD6-40DA-AC15-348ED00BB287}" type="datetimeFigureOut">
               <a:rPr lang="es-MX" smtClean="0"/>
-              <a:t>15/04/2020</a:t>
+              <a:t>23/04/2020</a:t>
             </a:fld>
             <a:endParaRPr lang="es-MX"/>
           </a:p>
@@ -1832,7 +1840,7 @@
           <a:p>
             <a:fld id="{D4424E7B-3FD6-40DA-AC15-348ED00BB287}" type="datetimeFigureOut">
               <a:rPr lang="es-MX" smtClean="0"/>
-              <a:t>15/04/2020</a:t>
+              <a:t>23/04/2020</a:t>
             </a:fld>
             <a:endParaRPr lang="es-MX"/>
           </a:p>
@@ -1974,7 +1982,7 @@
           <a:p>
             <a:fld id="{D4424E7B-3FD6-40DA-AC15-348ED00BB287}" type="datetimeFigureOut">
               <a:rPr lang="es-MX" smtClean="0"/>
-              <a:t>15/04/2020</a:t>
+              <a:t>23/04/2020</a:t>
             </a:fld>
             <a:endParaRPr lang="es-MX"/>
           </a:p>
@@ -2087,7 +2095,7 @@
           <a:p>
             <a:fld id="{D4424E7B-3FD6-40DA-AC15-348ED00BB287}" type="datetimeFigureOut">
               <a:rPr lang="es-MX" smtClean="0"/>
-              <a:t>15/04/2020</a:t>
+              <a:t>23/04/2020</a:t>
             </a:fld>
             <a:endParaRPr lang="es-MX"/>
           </a:p>
@@ -2400,7 +2408,7 @@
           <a:p>
             <a:fld id="{D4424E7B-3FD6-40DA-AC15-348ED00BB287}" type="datetimeFigureOut">
               <a:rPr lang="es-MX" smtClean="0"/>
-              <a:t>15/04/2020</a:t>
+              <a:t>23/04/2020</a:t>
             </a:fld>
             <a:endParaRPr lang="es-MX"/>
           </a:p>
@@ -2689,7 +2697,7 @@
           <a:p>
             <a:fld id="{D4424E7B-3FD6-40DA-AC15-348ED00BB287}" type="datetimeFigureOut">
               <a:rPr lang="es-MX" smtClean="0"/>
-              <a:t>15/04/2020</a:t>
+              <a:t>23/04/2020</a:t>
             </a:fld>
             <a:endParaRPr lang="es-MX"/>
           </a:p>
@@ -2932,7 +2940,7 @@
           <a:p>
             <a:fld id="{D4424E7B-3FD6-40DA-AC15-348ED00BB287}" type="datetimeFigureOut">
               <a:rPr lang="es-MX" smtClean="0"/>
-              <a:t>15/04/2020</a:t>
+              <a:t>23/04/2020</a:t>
             </a:fld>
             <a:endParaRPr lang="es-MX"/>
           </a:p>
@@ -3431,6 +3439,293 @@
 </p:sld>
 </file>
 
+<file path=ppt/slides/slide10.xml><?xml version="1.0" encoding="utf-8"?>
+<p:sld xmlns:a="http://schemas.openxmlformats.org/drawingml/2006/main" xmlns:r="http://schemas.openxmlformats.org/officeDocument/2006/relationships" xmlns:p="http://schemas.openxmlformats.org/presentationml/2006/main">
+  <p:cSld>
+    <p:spTree>
+      <p:nvGrpSpPr>
+        <p:cNvPr id="1" name=""/>
+        <p:cNvGrpSpPr/>
+        <p:nvPr/>
+      </p:nvGrpSpPr>
+      <p:grpSpPr>
+        <a:xfrm>
+          <a:off x="0" y="0"/>
+          <a:ext cx="0" cy="0"/>
+          <a:chOff x="0" y="0"/>
+          <a:chExt cx="0" cy="0"/>
+        </a:xfrm>
+      </p:grpSpPr>
+      <p:sp>
+        <p:nvSpPr>
+          <p:cNvPr id="2" name="Título 1">
+            <a:extLst>
+              <a:ext uri="{FF2B5EF4-FFF2-40B4-BE49-F238E27FC236}">
+                <a16:creationId xmlns:a16="http://schemas.microsoft.com/office/drawing/2014/main" id="{8C6B93B8-AFA5-4DFA-A0A0-C3A70BB14487}"/>
+              </a:ext>
+            </a:extLst>
+          </p:cNvPr>
+          <p:cNvSpPr>
+            <a:spLocks noGrp="1"/>
+          </p:cNvSpPr>
+          <p:nvPr>
+            <p:ph type="title"/>
+          </p:nvPr>
+        </p:nvSpPr>
+        <p:spPr>
+          <a:xfrm>
+            <a:off x="217415" y="172178"/>
+            <a:ext cx="10515600" cy="1325563"/>
+          </a:xfrm>
+          <a:solidFill>
+            <a:schemeClr val="accent2">
+              <a:lumMod val="60000"/>
+              <a:lumOff val="40000"/>
+            </a:schemeClr>
+          </a:solidFill>
+        </p:spPr>
+        <p:txBody>
+          <a:bodyPr/>
+          <a:lstStyle/>
+          <a:p>
+            <a:r>
+              <a:rPr lang="es-MX" dirty="0"/>
+              <a:t>SEGUNDA VUELTA – Evaluación Final</a:t>
+            </a:r>
+          </a:p>
+        </p:txBody>
+      </p:sp>
+      <p:sp>
+        <p:nvSpPr>
+          <p:cNvPr id="3" name="Marcador de contenido 2">
+            <a:extLst>
+              <a:ext uri="{FF2B5EF4-FFF2-40B4-BE49-F238E27FC236}">
+                <a16:creationId xmlns:a16="http://schemas.microsoft.com/office/drawing/2014/main" id="{B319AA4F-618A-4BDF-BBC1-C22D1CE2F01B}"/>
+              </a:ext>
+            </a:extLst>
+          </p:cNvPr>
+          <p:cNvSpPr>
+            <a:spLocks noGrp="1"/>
+          </p:cNvSpPr>
+          <p:nvPr>
+            <p:ph idx="1"/>
+          </p:nvPr>
+        </p:nvSpPr>
+        <p:spPr>
+          <a:xfrm>
+            <a:off x="1426128" y="2256639"/>
+            <a:ext cx="9927672" cy="3920324"/>
+          </a:xfrm>
+          <a:solidFill>
+            <a:schemeClr val="accent2">
+              <a:lumMod val="20000"/>
+              <a:lumOff val="80000"/>
+            </a:schemeClr>
+          </a:solidFill>
+        </p:spPr>
+        <p:txBody>
+          <a:bodyPr/>
+          <a:lstStyle/>
+          <a:p>
+            <a:pPr marL="457200" lvl="1" indent="0">
+              <a:buNone/>
+            </a:pPr>
+            <a:r>
+              <a:rPr lang="es-MX" dirty="0"/>
+              <a:t>Examen de respuesta abierta:</a:t>
+            </a:r>
+          </a:p>
+          <a:p>
+            <a:pPr marL="457200" lvl="1" indent="0">
+              <a:buNone/>
+            </a:pPr>
+            <a:endParaRPr lang="es-MX" dirty="0"/>
+          </a:p>
+          <a:p>
+            <a:pPr marL="457200" lvl="1" indent="0">
+              <a:buNone/>
+            </a:pPr>
+            <a:r>
+              <a:rPr lang="es-MX" dirty="0"/>
+              <a:t>En cuanto se les notifique que tienen que presentar su segunda vuelta, se les asignará y enviará por correo un artículo de investigación </a:t>
+            </a:r>
+            <a:r>
+              <a:rPr lang="es-MX" b="1" dirty="0"/>
+              <a:t>breve y en español </a:t>
+            </a:r>
+            <a:r>
+              <a:rPr lang="es-MX" dirty="0"/>
+              <a:t>y una copia de las preguntas que deberán responder con base en el artículo. Los detalles sobre el día y hora de entrega del examen de la segunda vuelta se darán más adelante.</a:t>
+            </a:r>
+          </a:p>
+          <a:p>
+            <a:pPr marL="457200" lvl="1" indent="0">
+              <a:buNone/>
+            </a:pPr>
+            <a:endParaRPr lang="es-MX" dirty="0"/>
+          </a:p>
+          <a:p>
+            <a:pPr marL="457200" lvl="1" indent="0">
+              <a:buNone/>
+            </a:pPr>
+            <a:r>
+              <a:rPr lang="es-MX" b="1" dirty="0"/>
+              <a:t>Si copian y pegan alguna sección del artículo, el examen queda reprobado en automático.</a:t>
+            </a:r>
+          </a:p>
+          <a:p>
+            <a:pPr marL="457200" lvl="1" indent="0">
+              <a:buNone/>
+            </a:pPr>
+            <a:endParaRPr lang="es-MX" sz="4400" dirty="0"/>
+          </a:p>
+          <a:p>
+            <a:pPr marL="457200" lvl="1" indent="0">
+              <a:buNone/>
+            </a:pPr>
+            <a:endParaRPr lang="es-MX" sz="4400" dirty="0"/>
+          </a:p>
+          <a:p>
+            <a:endParaRPr lang="es-MX" dirty="0"/>
+          </a:p>
+        </p:txBody>
+      </p:sp>
+    </p:spTree>
+    <p:extLst>
+      <p:ext uri="{BB962C8B-B14F-4D97-AF65-F5344CB8AC3E}">
+        <p14:creationId xmlns:p14="http://schemas.microsoft.com/office/powerpoint/2010/main" val="983925544"/>
+      </p:ext>
+    </p:extLst>
+  </p:cSld>
+  <p:clrMapOvr>
+    <a:masterClrMapping/>
+  </p:clrMapOvr>
+</p:sld>
+</file>
+
+<file path=ppt/slides/slide11.xml><?xml version="1.0" encoding="utf-8"?>
+<p:sld xmlns:a="http://schemas.openxmlformats.org/drawingml/2006/main" xmlns:r="http://schemas.openxmlformats.org/officeDocument/2006/relationships" xmlns:p="http://schemas.openxmlformats.org/presentationml/2006/main">
+  <p:cSld>
+    <p:spTree>
+      <p:nvGrpSpPr>
+        <p:cNvPr id="1" name=""/>
+        <p:cNvGrpSpPr/>
+        <p:nvPr/>
+      </p:nvGrpSpPr>
+      <p:grpSpPr>
+        <a:xfrm>
+          <a:off x="0" y="0"/>
+          <a:ext cx="0" cy="0"/>
+          <a:chOff x="0" y="0"/>
+          <a:chExt cx="0" cy="0"/>
+        </a:xfrm>
+      </p:grpSpPr>
+      <p:sp>
+        <p:nvSpPr>
+          <p:cNvPr id="2" name="Título 1">
+            <a:extLst>
+              <a:ext uri="{FF2B5EF4-FFF2-40B4-BE49-F238E27FC236}">
+                <a16:creationId xmlns:a16="http://schemas.microsoft.com/office/drawing/2014/main" id="{0AF6D9F0-E888-4895-B2F2-8AD2D7FACC83}"/>
+              </a:ext>
+            </a:extLst>
+          </p:cNvPr>
+          <p:cNvSpPr>
+            <a:spLocks noGrp="1"/>
+          </p:cNvSpPr>
+          <p:nvPr>
+            <p:ph type="title"/>
+          </p:nvPr>
+        </p:nvSpPr>
+        <p:spPr>
+          <a:solidFill>
+            <a:srgbClr val="FF0000"/>
+          </a:solidFill>
+        </p:spPr>
+        <p:txBody>
+          <a:bodyPr/>
+          <a:lstStyle/>
+          <a:p>
+            <a:pPr algn="ctr"/>
+            <a:r>
+              <a:rPr lang="es-MX" b="1" dirty="0"/>
+              <a:t>E X T R A O R DI N A R I O </a:t>
+            </a:r>
+          </a:p>
+        </p:txBody>
+      </p:sp>
+      <p:sp>
+        <p:nvSpPr>
+          <p:cNvPr id="3" name="Marcador de contenido 2">
+            <a:extLst>
+              <a:ext uri="{FF2B5EF4-FFF2-40B4-BE49-F238E27FC236}">
+                <a16:creationId xmlns:a16="http://schemas.microsoft.com/office/drawing/2014/main" id="{2FEFE455-553F-4E86-9548-9D772399FDEA}"/>
+              </a:ext>
+            </a:extLst>
+          </p:cNvPr>
+          <p:cNvSpPr>
+            <a:spLocks noGrp="1"/>
+          </p:cNvSpPr>
+          <p:nvPr>
+            <p:ph idx="1"/>
+          </p:nvPr>
+        </p:nvSpPr>
+        <p:spPr>
+          <a:solidFill>
+            <a:schemeClr val="accent2">
+              <a:lumMod val="20000"/>
+              <a:lumOff val="80000"/>
+            </a:schemeClr>
+          </a:solidFill>
+        </p:spPr>
+        <p:txBody>
+          <a:bodyPr/>
+          <a:lstStyle/>
+          <a:p>
+            <a:pPr marL="457200" lvl="1" indent="0" algn="ctr">
+              <a:buNone/>
+            </a:pPr>
+            <a:endParaRPr lang="es-MX" sz="5500" b="1" dirty="0"/>
+          </a:p>
+          <a:p>
+            <a:pPr marL="457200" lvl="1" indent="0" algn="ctr">
+              <a:buNone/>
+            </a:pPr>
+            <a:r>
+              <a:rPr lang="es-MX" sz="5500" b="1" dirty="0"/>
+              <a:t>Examen de conocimientos.</a:t>
+            </a:r>
+          </a:p>
+          <a:p>
+            <a:pPr marL="0" indent="0" algn="ctr">
+              <a:buNone/>
+            </a:pPr>
+            <a:r>
+              <a:rPr lang="es-MX" dirty="0"/>
+              <a:t>30 preguntas de opción múltiple y 10 preguntas abiertas sobre los temas revisados a lo largo de todo el curso.</a:t>
+            </a:r>
+            <a:endParaRPr lang="es-MX" sz="4800" dirty="0"/>
+          </a:p>
+          <a:p>
+            <a:pPr marL="0" indent="0">
+              <a:buNone/>
+            </a:pPr>
+            <a:endParaRPr lang="es-MX" dirty="0"/>
+          </a:p>
+        </p:txBody>
+      </p:sp>
+    </p:spTree>
+    <p:extLst>
+      <p:ext uri="{BB962C8B-B14F-4D97-AF65-F5344CB8AC3E}">
+        <p14:creationId xmlns:p14="http://schemas.microsoft.com/office/powerpoint/2010/main" val="2919591534"/>
+      </p:ext>
+    </p:extLst>
+  </p:cSld>
+  <p:clrMapOvr>
+    <a:masterClrMapping/>
+  </p:clrMapOvr>
+</p:sld>
+</file>
+
 <file path=ppt/slides/slide2.xml><?xml version="1.0" encoding="utf-8"?>
 <p:sld xmlns:a="http://schemas.openxmlformats.org/drawingml/2006/main" xmlns:r="http://schemas.openxmlformats.org/officeDocument/2006/relationships" xmlns:p="http://schemas.openxmlformats.org/presentationml/2006/main">
   <p:cSld>
@@ -4022,7 +4317,18 @@
             <p:ph type="title"/>
           </p:nvPr>
         </p:nvSpPr>
-        <p:spPr/>
+        <p:spPr>
+          <a:xfrm>
+            <a:off x="292916" y="130130"/>
+            <a:ext cx="10515600" cy="1325563"/>
+          </a:xfrm>
+          <a:solidFill>
+            <a:schemeClr val="accent4">
+              <a:lumMod val="60000"/>
+              <a:lumOff val="40000"/>
+            </a:schemeClr>
+          </a:solidFill>
+        </p:spPr>
         <p:txBody>
           <a:bodyPr/>
           <a:lstStyle/>
@@ -4050,70 +4356,37 @@
             <p:ph idx="1"/>
           </p:nvPr>
         </p:nvSpPr>
-        <p:spPr/>
+        <p:spPr>
+          <a:xfrm>
+            <a:off x="1233182" y="2189527"/>
+            <a:ext cx="10120618" cy="4303348"/>
+          </a:xfrm>
+          <a:solidFill>
+            <a:schemeClr val="accent4">
+              <a:lumMod val="20000"/>
+              <a:lumOff val="80000"/>
+            </a:schemeClr>
+          </a:solidFill>
+        </p:spPr>
         <p:txBody>
           <a:bodyPr>
-            <a:normAutofit fontScale="92500" lnSpcReduction="20000"/>
+            <a:normAutofit/>
           </a:bodyPr>
           <a:lstStyle/>
           <a:p>
             <a:pPr marL="457200" lvl="1" indent="0">
               <a:buNone/>
             </a:pPr>
-            <a:r>
-              <a:rPr lang="es-ES" dirty="0"/>
-              <a:t>Entrega de trabajo de investigación con las siguientes características:</a:t>
-            </a:r>
-            <a:endParaRPr lang="es-MX" sz="4400" dirty="0"/>
-          </a:p>
-          <a:p>
-            <a:r>
-              <a:rPr lang="es-ES" dirty="0"/>
-              <a:t>0) Índice y Resumen general del trabajo</a:t>
-            </a:r>
-            <a:endParaRPr lang="es-MX" sz="4800" dirty="0"/>
-          </a:p>
-          <a:p>
-            <a:r>
-              <a:rPr lang="es-ES" dirty="0"/>
-              <a:t>1) Planteamiento del problema (Pregunta de investigación, justificación y objetivos)</a:t>
-            </a:r>
-            <a:endParaRPr lang="es-MX" sz="4800" dirty="0"/>
-          </a:p>
-          <a:p>
-            <a:r>
-              <a:rPr lang="es-ES" dirty="0"/>
-              <a:t>2) Un Marco Teórico con al menos 10 referencias.</a:t>
-            </a:r>
-            <a:endParaRPr lang="es-MX" sz="4800" dirty="0"/>
-          </a:p>
-          <a:p>
-            <a:r>
-              <a:rPr lang="es-ES" dirty="0"/>
-              <a:t>3) Un Método completo y detallado (Señalando técnica de selección de la muestra, procedimiento y materiales empleados)</a:t>
-            </a:r>
-            <a:endParaRPr lang="es-MX" sz="4800" dirty="0"/>
-          </a:p>
-          <a:p>
-            <a:r>
-              <a:rPr lang="es-ES" dirty="0"/>
-              <a:t>4) Recolección y presentación de datos mediante el uso de recursos gráficos.</a:t>
-            </a:r>
-            <a:endParaRPr lang="es-MX" sz="4800" dirty="0"/>
-          </a:p>
-          <a:p>
-            <a:r>
-              <a:rPr lang="es-ES" dirty="0"/>
-              <a:t>5) Discusión y Conclusiones</a:t>
-            </a:r>
-            <a:endParaRPr lang="es-MX" sz="4800" dirty="0"/>
-          </a:p>
-          <a:p>
-            <a:r>
-              <a:rPr lang="es-ES" dirty="0"/>
-              <a:t>6) Bibliografía con referencias estilo APA.</a:t>
-            </a:r>
-            <a:endParaRPr lang="es-MX" sz="4800" dirty="0"/>
+            <a:endParaRPr lang="es-MX" dirty="0"/>
+          </a:p>
+          <a:p>
+            <a:pPr marL="457200" lvl="1" indent="0" algn="ctr">
+              <a:buNone/>
+            </a:pPr>
+            <a:r>
+              <a:rPr lang="es-MX" sz="5000" dirty="0"/>
+              <a:t>Entrega de un NUEVO trabajo de investigación COMPLETO, que cumpla con las características descritas en el archivo “Formato TMI”.</a:t>
+            </a:r>
           </a:p>
           <a:p>
             <a:pPr marL="0" indent="0">
@@ -4126,7 +4399,7 @@
     </p:spTree>
     <p:extLst>
       <p:ext uri="{BB962C8B-B14F-4D97-AF65-F5344CB8AC3E}">
-        <p14:creationId xmlns:p14="http://schemas.microsoft.com/office/powerpoint/2010/main" val="1065823087"/>
+        <p14:creationId xmlns:p14="http://schemas.microsoft.com/office/powerpoint/2010/main" val="3834140402"/>
       </p:ext>
     </p:extLst>
   </p:cSld>
@@ -4158,7 +4431,7 @@
           <p:cNvPr id="2" name="Título 1">
             <a:extLst>
               <a:ext uri="{FF2B5EF4-FFF2-40B4-BE49-F238E27FC236}">
-                <a16:creationId xmlns:a16="http://schemas.microsoft.com/office/drawing/2014/main" id="{8C6B93B8-AFA5-4DFA-A0A0-C3A70BB14487}"/>
+                <a16:creationId xmlns:a16="http://schemas.microsoft.com/office/drawing/2014/main" id="{6837F770-02A5-4B05-A9EA-DEA091973DC2}"/>
               </a:ext>
             </a:extLst>
           </p:cNvPr>
@@ -4169,14 +4442,25 @@
             <p:ph type="title"/>
           </p:nvPr>
         </p:nvSpPr>
-        <p:spPr/>
+        <p:spPr>
+          <a:xfrm>
+            <a:off x="292916" y="130130"/>
+            <a:ext cx="10515600" cy="1325563"/>
+          </a:xfrm>
+          <a:solidFill>
+            <a:schemeClr val="accent4">
+              <a:lumMod val="60000"/>
+              <a:lumOff val="40000"/>
+            </a:schemeClr>
+          </a:solidFill>
+        </p:spPr>
         <p:txBody>
           <a:bodyPr/>
           <a:lstStyle/>
           <a:p>
             <a:r>
               <a:rPr lang="es-MX" dirty="0"/>
-              <a:t>SEGUNDA VUELTA – Evaluación Final</a:t>
+              <a:t>PRIMERA VUELTA – Evaluación Final</a:t>
             </a:r>
           </a:p>
         </p:txBody>
@@ -4186,7 +4470,7 @@
           <p:cNvPr id="3" name="Marcador de contenido 2">
             <a:extLst>
               <a:ext uri="{FF2B5EF4-FFF2-40B4-BE49-F238E27FC236}">
-                <a16:creationId xmlns:a16="http://schemas.microsoft.com/office/drawing/2014/main" id="{B319AA4F-618A-4BDF-BBC1-C22D1CE2F01B}"/>
+                <a16:creationId xmlns:a16="http://schemas.microsoft.com/office/drawing/2014/main" id="{31F2CC44-F55B-4F0C-8330-5F6B95AD3F7D}"/>
               </a:ext>
             </a:extLst>
           </p:cNvPr>
@@ -4197,26 +4481,57 @@
             <p:ph idx="1"/>
           </p:nvPr>
         </p:nvSpPr>
-        <p:spPr/>
-        <p:txBody>
-          <a:bodyPr/>
-          <a:lstStyle/>
-          <a:p>
-            <a:pPr lvl="1"/>
-            <a:r>
-              <a:rPr lang="es-MX" dirty="0"/>
-              <a:t>Revisión crítica de un artículo de investigación.</a:t>
-            </a:r>
-            <a:endParaRPr lang="es-MX" sz="4400" dirty="0"/>
-          </a:p>
-          <a:p>
-            <a:r>
-              <a:rPr lang="es-MX" dirty="0"/>
-              <a:t>Se asignará un artículo de investigación para que los estudiantes revisen, identificando sus fortalezas y debilidades de acuerdo con una serie de preguntas guía.</a:t>
-            </a:r>
-            <a:endParaRPr lang="es-MX" sz="4800" dirty="0"/>
-          </a:p>
-          <a:p>
+        <p:spPr>
+          <a:xfrm>
+            <a:off x="763398" y="2204309"/>
+            <a:ext cx="10120618" cy="2971698"/>
+          </a:xfrm>
+          <a:solidFill>
+            <a:schemeClr val="accent4">
+              <a:lumMod val="20000"/>
+              <a:lumOff val="80000"/>
+            </a:schemeClr>
+          </a:solidFill>
+        </p:spPr>
+        <p:txBody>
+          <a:bodyPr>
+            <a:normAutofit fontScale="92500" lnSpcReduction="10000"/>
+          </a:bodyPr>
+          <a:lstStyle/>
+          <a:p>
+            <a:pPr marL="457200" lvl="1" indent="0">
+              <a:buNone/>
+            </a:pPr>
+            <a:endParaRPr lang="es-MX" dirty="0"/>
+          </a:p>
+          <a:p>
+            <a:pPr marL="457200" lvl="1" indent="0" algn="ctr">
+              <a:buNone/>
+            </a:pPr>
+            <a:r>
+              <a:rPr lang="es-MX" sz="5000" u="sng" dirty="0"/>
+              <a:t>Viernes 29 de mayo</a:t>
+            </a:r>
+          </a:p>
+          <a:p>
+            <a:pPr marL="457200" lvl="1" indent="0" algn="ctr">
+              <a:buNone/>
+            </a:pPr>
+            <a:endParaRPr lang="es-MX" sz="5000" u="sng" dirty="0"/>
+          </a:p>
+          <a:p>
+            <a:pPr marL="457200" lvl="1" indent="0" algn="ctr">
+              <a:buNone/>
+            </a:pPr>
+            <a:r>
+              <a:rPr lang="es-MX" sz="5000" b="1" dirty="0"/>
+              <a:t>Las entregas después de la hora de clase se califican sobre 8</a:t>
+            </a:r>
+          </a:p>
+          <a:p>
+            <a:pPr marL="0" indent="0">
+              <a:buNone/>
+            </a:pPr>
             <a:endParaRPr lang="es-MX" dirty="0"/>
           </a:p>
         </p:txBody>
@@ -4224,7 +4539,7 @@
     </p:spTree>
     <p:extLst>
       <p:ext uri="{BB962C8B-B14F-4D97-AF65-F5344CB8AC3E}">
-        <p14:creationId xmlns:p14="http://schemas.microsoft.com/office/powerpoint/2010/main" val="983925544"/>
+        <p14:creationId xmlns:p14="http://schemas.microsoft.com/office/powerpoint/2010/main" val="3143695486"/>
       </p:ext>
     </p:extLst>
   </p:cSld>
@@ -4256,7 +4571,7 @@
           <p:cNvPr id="2" name="Título 1">
             <a:extLst>
               <a:ext uri="{FF2B5EF4-FFF2-40B4-BE49-F238E27FC236}">
-                <a16:creationId xmlns:a16="http://schemas.microsoft.com/office/drawing/2014/main" id="{0AF6D9F0-E888-4895-B2F2-8AD2D7FACC83}"/>
+                <a16:creationId xmlns:a16="http://schemas.microsoft.com/office/drawing/2014/main" id="{6837F770-02A5-4B05-A9EA-DEA091973DC2}"/>
               </a:ext>
             </a:extLst>
           </p:cNvPr>
@@ -4267,14 +4582,25 @@
             <p:ph type="title"/>
           </p:nvPr>
         </p:nvSpPr>
-        <p:spPr/>
+        <p:spPr>
+          <a:xfrm>
+            <a:off x="259360" y="130130"/>
+            <a:ext cx="10515600" cy="1325563"/>
+          </a:xfrm>
+          <a:solidFill>
+            <a:schemeClr val="accent4">
+              <a:lumMod val="60000"/>
+              <a:lumOff val="40000"/>
+            </a:schemeClr>
+          </a:solidFill>
+        </p:spPr>
         <p:txBody>
           <a:bodyPr/>
           <a:lstStyle/>
           <a:p>
             <a:r>
               <a:rPr lang="es-MX" dirty="0"/>
-              <a:t>E X T R A O R DI N A R I O </a:t>
+              <a:t>PRIMERA VUELTA – Evaluación Final</a:t>
             </a:r>
           </a:p>
         </p:txBody>
@@ -4284,7 +4610,7 @@
           <p:cNvPr id="3" name="Marcador de contenido 2">
             <a:extLst>
               <a:ext uri="{FF2B5EF4-FFF2-40B4-BE49-F238E27FC236}">
-                <a16:creationId xmlns:a16="http://schemas.microsoft.com/office/drawing/2014/main" id="{2FEFE455-553F-4E86-9548-9D772399FDEA}"/>
+                <a16:creationId xmlns:a16="http://schemas.microsoft.com/office/drawing/2014/main" id="{31F2CC44-F55B-4F0C-8330-5F6B95AD3F7D}"/>
               </a:ext>
             </a:extLst>
           </p:cNvPr>
@@ -4295,22 +4621,87 @@
             <p:ph idx="1"/>
           </p:nvPr>
         </p:nvSpPr>
-        <p:spPr/>
-        <p:txBody>
-          <a:bodyPr/>
-          <a:lstStyle/>
-          <a:p>
-            <a:pPr lvl="1"/>
-            <a:r>
-              <a:rPr lang="es-MX" dirty="0"/>
-              <a:t>Examen de conocimientos.</a:t>
-            </a:r>
-            <a:endParaRPr lang="es-MX" sz="4400" dirty="0"/>
-          </a:p>
-          <a:p>
-            <a:r>
-              <a:rPr lang="es-MX" dirty="0"/>
-              <a:t>30 preguntas de opción múltiple y 10 preguntas abiertas.</a:t>
+        <p:spPr>
+          <a:xfrm>
+            <a:off x="570451" y="1434517"/>
+            <a:ext cx="10783349" cy="5058358"/>
+          </a:xfrm>
+        </p:spPr>
+        <p:txBody>
+          <a:bodyPr>
+            <a:normAutofit lnSpcReduction="10000"/>
+          </a:bodyPr>
+          <a:lstStyle/>
+          <a:p>
+            <a:endParaRPr lang="es-ES" dirty="0"/>
+          </a:p>
+          <a:p>
+            <a:pPr marL="0" indent="0">
+              <a:buNone/>
+            </a:pPr>
+            <a:r>
+              <a:rPr lang="es-ES" dirty="0"/>
+              <a:t>0) Índice y Resumen general del trabajo</a:t>
+            </a:r>
+            <a:endParaRPr lang="es-MX" sz="4800" dirty="0"/>
+          </a:p>
+          <a:p>
+            <a:pPr marL="0" indent="0">
+              <a:buNone/>
+            </a:pPr>
+            <a:r>
+              <a:rPr lang="es-ES" dirty="0"/>
+              <a:t>1) Planteamiento del problema (Pregunta de investigación, justificación y objetivos)</a:t>
+            </a:r>
+            <a:endParaRPr lang="es-MX" sz="4800" dirty="0"/>
+          </a:p>
+          <a:p>
+            <a:pPr marL="0" indent="0">
+              <a:buNone/>
+            </a:pPr>
+            <a:r>
+              <a:rPr lang="es-ES" dirty="0"/>
+              <a:t>2) Un Marco Teórico con al menos 10 referencias.</a:t>
+            </a:r>
+            <a:endParaRPr lang="es-MX" sz="4800" dirty="0"/>
+          </a:p>
+          <a:p>
+            <a:pPr marL="0" indent="0">
+              <a:buNone/>
+            </a:pPr>
+            <a:r>
+              <a:rPr lang="es-ES" dirty="0"/>
+              <a:t>3) Un Método completo y detallado (Señalando técnica de selección de la muestra, procedimiento y materiales empleados)</a:t>
+            </a:r>
+            <a:endParaRPr lang="es-MX" sz="4800" dirty="0"/>
+          </a:p>
+          <a:p>
+            <a:pPr marL="0" indent="0">
+              <a:buNone/>
+            </a:pPr>
+            <a:r>
+              <a:rPr lang="es-ES" dirty="0"/>
+              <a:t>4) Recolección y presentación de datos mediante el uso de recursos gráficos.</a:t>
+            </a:r>
+            <a:endParaRPr lang="es-MX" sz="4800" dirty="0"/>
+          </a:p>
+          <a:p>
+            <a:pPr marL="0" indent="0">
+              <a:buNone/>
+            </a:pPr>
+            <a:r>
+              <a:rPr lang="es-ES" dirty="0"/>
+              <a:t>5) Discusión y Conclusiones</a:t>
+            </a:r>
+            <a:endParaRPr lang="es-MX" sz="4800" dirty="0"/>
+          </a:p>
+          <a:p>
+            <a:pPr marL="0" indent="0">
+              <a:buNone/>
+            </a:pPr>
+            <a:r>
+              <a:rPr lang="es-ES" dirty="0"/>
+              <a:t>6) Bibliografía con referencias estilo APA.</a:t>
             </a:r>
             <a:endParaRPr lang="es-MX" sz="4800" dirty="0"/>
           </a:p>
@@ -4325,7 +4716,132 @@
     </p:spTree>
     <p:extLst>
       <p:ext uri="{BB962C8B-B14F-4D97-AF65-F5344CB8AC3E}">
-        <p14:creationId xmlns:p14="http://schemas.microsoft.com/office/powerpoint/2010/main" val="2919591534"/>
+        <p14:creationId xmlns:p14="http://schemas.microsoft.com/office/powerpoint/2010/main" val="1065823087"/>
+      </p:ext>
+    </p:extLst>
+  </p:cSld>
+  <p:clrMapOvr>
+    <a:masterClrMapping/>
+  </p:clrMapOvr>
+</p:sld>
+</file>
+
+<file path=ppt/slides/slide9.xml><?xml version="1.0" encoding="utf-8"?>
+<p:sld xmlns:a="http://schemas.openxmlformats.org/drawingml/2006/main" xmlns:r="http://schemas.openxmlformats.org/officeDocument/2006/relationships" xmlns:p="http://schemas.openxmlformats.org/presentationml/2006/main">
+  <p:cSld>
+    <p:spTree>
+      <p:nvGrpSpPr>
+        <p:cNvPr id="1" name=""/>
+        <p:cNvGrpSpPr/>
+        <p:nvPr/>
+      </p:nvGrpSpPr>
+      <p:grpSpPr>
+        <a:xfrm>
+          <a:off x="0" y="0"/>
+          <a:ext cx="0" cy="0"/>
+          <a:chOff x="0" y="0"/>
+          <a:chExt cx="0" cy="0"/>
+        </a:xfrm>
+      </p:grpSpPr>
+      <p:sp>
+        <p:nvSpPr>
+          <p:cNvPr id="2" name="Título 1">
+            <a:extLst>
+              <a:ext uri="{FF2B5EF4-FFF2-40B4-BE49-F238E27FC236}">
+                <a16:creationId xmlns:a16="http://schemas.microsoft.com/office/drawing/2014/main" id="{6837F770-02A5-4B05-A9EA-DEA091973DC2}"/>
+              </a:ext>
+            </a:extLst>
+          </p:cNvPr>
+          <p:cNvSpPr>
+            <a:spLocks noGrp="1"/>
+          </p:cNvSpPr>
+          <p:nvPr>
+            <p:ph type="title"/>
+          </p:nvPr>
+        </p:nvSpPr>
+        <p:spPr>
+          <a:xfrm>
+            <a:off x="292916" y="130130"/>
+            <a:ext cx="10515600" cy="1325563"/>
+          </a:xfrm>
+          <a:solidFill>
+            <a:schemeClr val="accent4">
+              <a:lumMod val="60000"/>
+              <a:lumOff val="40000"/>
+            </a:schemeClr>
+          </a:solidFill>
+        </p:spPr>
+        <p:txBody>
+          <a:bodyPr/>
+          <a:lstStyle/>
+          <a:p>
+            <a:r>
+              <a:rPr lang="es-MX" dirty="0"/>
+              <a:t>PRIMERA VUELTA – Evaluación Final</a:t>
+            </a:r>
+          </a:p>
+        </p:txBody>
+      </p:sp>
+      <p:sp>
+        <p:nvSpPr>
+          <p:cNvPr id="3" name="Marcador de contenido 2">
+            <a:extLst>
+              <a:ext uri="{FF2B5EF4-FFF2-40B4-BE49-F238E27FC236}">
+                <a16:creationId xmlns:a16="http://schemas.microsoft.com/office/drawing/2014/main" id="{31F2CC44-F55B-4F0C-8330-5F6B95AD3F7D}"/>
+              </a:ext>
+            </a:extLst>
+          </p:cNvPr>
+          <p:cNvSpPr>
+            <a:spLocks noGrp="1"/>
+          </p:cNvSpPr>
+          <p:nvPr>
+            <p:ph idx="1"/>
+          </p:nvPr>
+        </p:nvSpPr>
+        <p:spPr>
+          <a:xfrm>
+            <a:off x="1233182" y="2189527"/>
+            <a:ext cx="10120618" cy="4303348"/>
+          </a:xfrm>
+          <a:solidFill>
+            <a:schemeClr val="accent4">
+              <a:lumMod val="20000"/>
+              <a:lumOff val="80000"/>
+            </a:schemeClr>
+          </a:solidFill>
+        </p:spPr>
+        <p:txBody>
+          <a:bodyPr>
+            <a:normAutofit/>
+          </a:bodyPr>
+          <a:lstStyle/>
+          <a:p>
+            <a:pPr marL="457200" lvl="1" indent="0">
+              <a:buNone/>
+            </a:pPr>
+            <a:endParaRPr lang="es-MX" dirty="0"/>
+          </a:p>
+          <a:p>
+            <a:pPr marL="457200" lvl="1" indent="0" algn="ctr">
+              <a:buNone/>
+            </a:pPr>
+            <a:r>
+              <a:rPr lang="es-MX" sz="5000" dirty="0"/>
+              <a:t>Revisen el archivo “Formato TMI” para garantizar una mejor calificación.</a:t>
+            </a:r>
+          </a:p>
+          <a:p>
+            <a:pPr marL="0" indent="0">
+              <a:buNone/>
+            </a:pPr>
+            <a:endParaRPr lang="es-MX" dirty="0"/>
+          </a:p>
+        </p:txBody>
+      </p:sp>
+    </p:spTree>
+    <p:extLst>
+      <p:ext uri="{BB962C8B-B14F-4D97-AF65-F5344CB8AC3E}">
+        <p14:creationId xmlns:p14="http://schemas.microsoft.com/office/powerpoint/2010/main" val="2527521754"/>
       </p:ext>
     </p:extLst>
   </p:cSld>

</xml_diff>